<commit_message>
Updated PowerPoint to include link to GitHub
</commit_message>
<xml_diff>
--- a/AzDataFactoryDemo_SqlSpSink.pptx
+++ b/AzDataFactoryDemo_SqlSpSink.pptx
@@ -168,12 +168,12 @@
   <pc:docChgLst>
     <pc:chgData name="Marc Jellinek" userId="b94e775c42e2e773" providerId="LiveId" clId="{1EA7A637-13B6-4C16-A09A-92536B4596CF}"/>
     <pc:docChg chg="undo custSel addSld delSld modSld sldOrd">
-      <pc:chgData name="Marc Jellinek" userId="b94e775c42e2e773" providerId="LiveId" clId="{1EA7A637-13B6-4C16-A09A-92536B4596CF}" dt="2019-10-15T02:19:31.928" v="7138" actId="20577"/>
+      <pc:chgData name="Marc Jellinek" userId="b94e775c42e2e773" providerId="LiveId" clId="{1EA7A637-13B6-4C16-A09A-92536B4596CF}" dt="2019-10-21T17:36:50.731" v="7339" actId="20577"/>
       <pc:docMkLst>
         <pc:docMk/>
       </pc:docMkLst>
       <pc:sldChg chg="modSp">
-        <pc:chgData name="Marc Jellinek" userId="b94e775c42e2e773" providerId="LiveId" clId="{1EA7A637-13B6-4C16-A09A-92536B4596CF}" dt="2019-10-15T02:19:31.928" v="7138" actId="20577"/>
+        <pc:chgData name="Marc Jellinek" userId="b94e775c42e2e773" providerId="LiveId" clId="{1EA7A637-13B6-4C16-A09A-92536B4596CF}" dt="2019-10-21T17:29:38.528" v="7281" actId="27636"/>
         <pc:sldMkLst>
           <pc:docMk/>
           <pc:sldMk cId="2833334754" sldId="256"/>
@@ -187,7 +187,7 @@
           </ac:spMkLst>
         </pc:spChg>
         <pc:spChg chg="mod">
-          <ac:chgData name="Marc Jellinek" userId="b94e775c42e2e773" providerId="LiveId" clId="{1EA7A637-13B6-4C16-A09A-92536B4596CF}" dt="2019-10-15T01:43:29.136" v="7131" actId="20577"/>
+          <ac:chgData name="Marc Jellinek" userId="b94e775c42e2e773" providerId="LiveId" clId="{1EA7A637-13B6-4C16-A09A-92536B4596CF}" dt="2019-10-21T17:29:38.528" v="7281" actId="27636"/>
           <ac:spMkLst>
             <pc:docMk/>
             <pc:sldMk cId="2833334754" sldId="256"/>
@@ -196,13 +196,13 @@
         </pc:spChg>
       </pc:sldChg>
       <pc:sldChg chg="modSp">
-        <pc:chgData name="Marc Jellinek" userId="b94e775c42e2e773" providerId="LiveId" clId="{1EA7A637-13B6-4C16-A09A-92536B4596CF}" dt="2019-10-14T00:15:37.419" v="6520" actId="20577"/>
+        <pc:chgData name="Marc Jellinek" userId="b94e775c42e2e773" providerId="LiveId" clId="{1EA7A637-13B6-4C16-A09A-92536B4596CF}" dt="2019-10-21T17:32:20.310" v="7305" actId="20577"/>
         <pc:sldMkLst>
           <pc:docMk/>
           <pc:sldMk cId="3158512884" sldId="257"/>
         </pc:sldMkLst>
         <pc:spChg chg="mod">
-          <ac:chgData name="Marc Jellinek" userId="b94e775c42e2e773" providerId="LiveId" clId="{1EA7A637-13B6-4C16-A09A-92536B4596CF}" dt="2019-10-14T00:15:37.419" v="6520" actId="20577"/>
+          <ac:chgData name="Marc Jellinek" userId="b94e775c42e2e773" providerId="LiveId" clId="{1EA7A637-13B6-4C16-A09A-92536B4596CF}" dt="2019-10-21T17:32:20.310" v="7305" actId="20577"/>
           <ac:spMkLst>
             <pc:docMk/>
             <pc:sldMk cId="3158512884" sldId="257"/>
@@ -234,7 +234,7 @@
         </pc:graphicFrameChg>
       </pc:sldChg>
       <pc:sldChg chg="addSp modSp">
-        <pc:chgData name="Marc Jellinek" userId="b94e775c42e2e773" providerId="LiveId" clId="{1EA7A637-13B6-4C16-A09A-92536B4596CF}" dt="2019-10-14T01:06:22.332" v="6968" actId="14100"/>
+        <pc:chgData name="Marc Jellinek" userId="b94e775c42e2e773" providerId="LiveId" clId="{1EA7A637-13B6-4C16-A09A-92536B4596CF}" dt="2019-10-21T17:36:50.731" v="7339" actId="20577"/>
         <pc:sldMkLst>
           <pc:docMk/>
           <pc:sldMk cId="1366597754" sldId="259"/>
@@ -248,7 +248,7 @@
           </ac:spMkLst>
         </pc:spChg>
         <pc:graphicFrameChg chg="add mod">
-          <ac:chgData name="Marc Jellinek" userId="b94e775c42e2e773" providerId="LiveId" clId="{1EA7A637-13B6-4C16-A09A-92536B4596CF}" dt="2019-10-14T01:06:22.332" v="6968" actId="14100"/>
+          <ac:chgData name="Marc Jellinek" userId="b94e775c42e2e773" providerId="LiveId" clId="{1EA7A637-13B6-4C16-A09A-92536B4596CF}" dt="2019-10-21T17:36:50.731" v="7339" actId="20577"/>
           <ac:graphicFrameMkLst>
             <pc:docMk/>
             <pc:sldMk cId="1366597754" sldId="259"/>
@@ -4386,6 +4386,50 @@
         </a:p>
       </dgm:t>
     </dgm:pt>
+    <dgm:pt modelId="{30C67D2A-AF42-4755-A30D-37AA25F225C4}">
+      <dgm:prSet phldrT="[Text]"/>
+      <dgm:spPr/>
+      <dgm:t>
+        <a:bodyPr/>
+        <a:lstStyle/>
+        <a:p>
+          <a:r>
+            <a:rPr lang="en-US" dirty="0"/>
+            <a:t>Target Server</a:t>
+          </a:r>
+        </a:p>
+      </dgm:t>
+    </dgm:pt>
+    <dgm:pt modelId="{07B19707-1B28-4929-8FCD-1FFF7AA5773E}" type="parTrans" cxnId="{C3923CCC-77A8-4223-91E9-7A331AD501A5}">
+      <dgm:prSet/>
+      <dgm:spPr/>
+    </dgm:pt>
+    <dgm:pt modelId="{781BEC80-35D0-43B8-8934-751AEC48A3E2}" type="sibTrans" cxnId="{C3923CCC-77A8-4223-91E9-7A331AD501A5}">
+      <dgm:prSet/>
+      <dgm:spPr/>
+    </dgm:pt>
+    <dgm:pt modelId="{3E13CED3-BB23-4724-99E5-FB9654B64085}">
+      <dgm:prSet phldrT="[Text]"/>
+      <dgm:spPr/>
+      <dgm:t>
+        <a:bodyPr/>
+        <a:lstStyle/>
+        <a:p>
+          <a:r>
+            <a:rPr lang="en-US" dirty="0"/>
+            <a:t>Source Server</a:t>
+          </a:r>
+        </a:p>
+      </dgm:t>
+    </dgm:pt>
+    <dgm:pt modelId="{F7097BFA-9BBA-4B54-B479-17BCB8FA6463}" type="parTrans" cxnId="{ABAB5FFE-EC33-43D6-96FA-98436CAF3B0F}">
+      <dgm:prSet/>
+      <dgm:spPr/>
+    </dgm:pt>
+    <dgm:pt modelId="{387A157D-7CF2-47BF-95F9-A70ACEFF2735}" type="sibTrans" cxnId="{ABAB5FFE-EC33-43D6-96FA-98436CAF3B0F}">
+      <dgm:prSet/>
+      <dgm:spPr/>
+    </dgm:pt>
     <dgm:pt modelId="{B0FC1AA3-162F-4AED-9946-653D28AF5C14}" type="pres">
       <dgm:prSet presAssocID="{C11DBB7E-0079-4899-95FD-5909281E4F6C}" presName="hierChild1" presStyleCnt="0">
         <dgm:presLayoutVars>
@@ -4427,8 +4471,40 @@
       <dgm:prSet presAssocID="{A768C853-21B8-400C-8991-0650BA278A1D}" presName="hierChild2" presStyleCnt="0"/>
       <dgm:spPr/>
     </dgm:pt>
+    <dgm:pt modelId="{54BCEC0A-5F84-4F7F-8660-5B67A8FFE110}" type="pres">
+      <dgm:prSet presAssocID="{07B19707-1B28-4929-8FCD-1FFF7AA5773E}" presName="Name64" presStyleLbl="parChTrans1D2" presStyleIdx="0" presStyleCnt="3"/>
+      <dgm:spPr/>
+    </dgm:pt>
+    <dgm:pt modelId="{F5CDA664-2A8E-4EF8-8FB5-73D311142289}" type="pres">
+      <dgm:prSet presAssocID="{30C67D2A-AF42-4755-A30D-37AA25F225C4}" presName="hierRoot2" presStyleCnt="0">
+        <dgm:presLayoutVars>
+          <dgm:hierBranch val="init"/>
+        </dgm:presLayoutVars>
+      </dgm:prSet>
+      <dgm:spPr/>
+    </dgm:pt>
+    <dgm:pt modelId="{09E1E638-AB33-473C-B96F-6BEAAC7F84F7}" type="pres">
+      <dgm:prSet presAssocID="{30C67D2A-AF42-4755-A30D-37AA25F225C4}" presName="rootComposite" presStyleCnt="0"/>
+      <dgm:spPr/>
+    </dgm:pt>
+    <dgm:pt modelId="{131EC883-A543-459C-A4ED-243F765DAB9E}" type="pres">
+      <dgm:prSet presAssocID="{30C67D2A-AF42-4755-A30D-37AA25F225C4}" presName="rootText" presStyleLbl="node2" presStyleIdx="0" presStyleCnt="3">
+        <dgm:presLayoutVars>
+          <dgm:chPref val="3"/>
+        </dgm:presLayoutVars>
+      </dgm:prSet>
+      <dgm:spPr/>
+    </dgm:pt>
+    <dgm:pt modelId="{E59A8A91-6703-4CFA-B0A9-709CF36DAC15}" type="pres">
+      <dgm:prSet presAssocID="{30C67D2A-AF42-4755-A30D-37AA25F225C4}" presName="rootConnector" presStyleLbl="node2" presStyleIdx="0" presStyleCnt="3"/>
+      <dgm:spPr/>
+    </dgm:pt>
+    <dgm:pt modelId="{1A3E6599-2548-4642-906A-CF6DC9523C55}" type="pres">
+      <dgm:prSet presAssocID="{30C67D2A-AF42-4755-A30D-37AA25F225C4}" presName="hierChild4" presStyleCnt="0"/>
+      <dgm:spPr/>
+    </dgm:pt>
     <dgm:pt modelId="{EBBE1E3B-F9B0-44F5-A0A8-4117FC445DE2}" type="pres">
-      <dgm:prSet presAssocID="{E63ED82B-4185-436B-AEBB-DBDDED9A9365}" presName="Name64" presStyleLbl="parChTrans1D2" presStyleIdx="0" presStyleCnt="3"/>
+      <dgm:prSet presAssocID="{E63ED82B-4185-436B-AEBB-DBDDED9A9365}" presName="Name64" presStyleLbl="parChTrans1D3" presStyleIdx="0" presStyleCnt="3"/>
       <dgm:spPr/>
     </dgm:pt>
     <dgm:pt modelId="{8FA0DE5F-FF7B-4D55-AD0B-E76AF573D018}" type="pres">
@@ -4444,7 +4520,7 @@
       <dgm:spPr/>
     </dgm:pt>
     <dgm:pt modelId="{DEE1F79C-2055-47D0-A0EC-02D2E44C2B8E}" type="pres">
-      <dgm:prSet presAssocID="{E39A4C13-A6FC-4EA3-ACC8-25D43B9AA34B}" presName="rootText" presStyleLbl="node2" presStyleIdx="0" presStyleCnt="3">
+      <dgm:prSet presAssocID="{E39A4C13-A6FC-4EA3-ACC8-25D43B9AA34B}" presName="rootText" presStyleLbl="node3" presStyleIdx="0" presStyleCnt="3">
         <dgm:presLayoutVars>
           <dgm:chPref val="3"/>
         </dgm:presLayoutVars>
@@ -4452,7 +4528,7 @@
       <dgm:spPr/>
     </dgm:pt>
     <dgm:pt modelId="{323AD881-19AE-4835-9324-C241FB13FD1D}" type="pres">
-      <dgm:prSet presAssocID="{E39A4C13-A6FC-4EA3-ACC8-25D43B9AA34B}" presName="rootConnector" presStyleLbl="node2" presStyleIdx="0" presStyleCnt="3"/>
+      <dgm:prSet presAssocID="{E39A4C13-A6FC-4EA3-ACC8-25D43B9AA34B}" presName="rootConnector" presStyleLbl="node3" presStyleIdx="0" presStyleCnt="3"/>
       <dgm:spPr/>
     </dgm:pt>
     <dgm:pt modelId="{5D3F7202-55E5-4A7B-93BE-C6723769E538}" type="pres">
@@ -4463,8 +4539,44 @@
       <dgm:prSet presAssocID="{E39A4C13-A6FC-4EA3-ACC8-25D43B9AA34B}" presName="hierChild5" presStyleCnt="0"/>
       <dgm:spPr/>
     </dgm:pt>
+    <dgm:pt modelId="{915A99AD-0ED1-4F28-858C-ABBCE49DC6E9}" type="pres">
+      <dgm:prSet presAssocID="{30C67D2A-AF42-4755-A30D-37AA25F225C4}" presName="hierChild5" presStyleCnt="0"/>
+      <dgm:spPr/>
+    </dgm:pt>
+    <dgm:pt modelId="{D68225B9-3F99-4DA4-B07A-384D3FE28F63}" type="pres">
+      <dgm:prSet presAssocID="{F7097BFA-9BBA-4B54-B479-17BCB8FA6463}" presName="Name64" presStyleLbl="parChTrans1D2" presStyleIdx="1" presStyleCnt="3"/>
+      <dgm:spPr/>
+    </dgm:pt>
+    <dgm:pt modelId="{5E548ED9-0B66-41AB-964A-C40BD95BC53C}" type="pres">
+      <dgm:prSet presAssocID="{3E13CED3-BB23-4724-99E5-FB9654B64085}" presName="hierRoot2" presStyleCnt="0">
+        <dgm:presLayoutVars>
+          <dgm:hierBranch val="init"/>
+        </dgm:presLayoutVars>
+      </dgm:prSet>
+      <dgm:spPr/>
+    </dgm:pt>
+    <dgm:pt modelId="{D9B95C35-E9F4-453D-BE7D-CB3B9BEA5019}" type="pres">
+      <dgm:prSet presAssocID="{3E13CED3-BB23-4724-99E5-FB9654B64085}" presName="rootComposite" presStyleCnt="0"/>
+      <dgm:spPr/>
+    </dgm:pt>
+    <dgm:pt modelId="{0C811EC5-A258-4658-BC55-9714EE710458}" type="pres">
+      <dgm:prSet presAssocID="{3E13CED3-BB23-4724-99E5-FB9654B64085}" presName="rootText" presStyleLbl="node2" presStyleIdx="1" presStyleCnt="3">
+        <dgm:presLayoutVars>
+          <dgm:chPref val="3"/>
+        </dgm:presLayoutVars>
+      </dgm:prSet>
+      <dgm:spPr/>
+    </dgm:pt>
+    <dgm:pt modelId="{2E59B674-54FB-49F7-A2E0-9B77D6216653}" type="pres">
+      <dgm:prSet presAssocID="{3E13CED3-BB23-4724-99E5-FB9654B64085}" presName="rootConnector" presStyleLbl="node2" presStyleIdx="1" presStyleCnt="3"/>
+      <dgm:spPr/>
+    </dgm:pt>
+    <dgm:pt modelId="{F9828230-7460-4188-8DD8-9F50090716E9}" type="pres">
+      <dgm:prSet presAssocID="{3E13CED3-BB23-4724-99E5-FB9654B64085}" presName="hierChild4" presStyleCnt="0"/>
+      <dgm:spPr/>
+    </dgm:pt>
     <dgm:pt modelId="{20E84821-898A-43E5-885F-6E4D5BF557EF}" type="pres">
-      <dgm:prSet presAssocID="{69AD2F08-ED15-4514-AFE5-C86746139DF7}" presName="Name64" presStyleLbl="parChTrans1D2" presStyleIdx="1" presStyleCnt="3"/>
+      <dgm:prSet presAssocID="{69AD2F08-ED15-4514-AFE5-C86746139DF7}" presName="Name64" presStyleLbl="parChTrans1D3" presStyleIdx="1" presStyleCnt="3"/>
       <dgm:spPr/>
     </dgm:pt>
     <dgm:pt modelId="{B6334A19-82A4-42AE-A74C-AC37D776C904}" type="pres">
@@ -4480,7 +4592,7 @@
       <dgm:spPr/>
     </dgm:pt>
     <dgm:pt modelId="{2763255F-0BD4-4E1C-98E0-6D4D222EBBCE}" type="pres">
-      <dgm:prSet presAssocID="{F6D970B7-89A8-4323-B40E-827D95103C70}" presName="rootText" presStyleLbl="node2" presStyleIdx="1" presStyleCnt="3">
+      <dgm:prSet presAssocID="{F6D970B7-89A8-4323-B40E-827D95103C70}" presName="rootText" presStyleLbl="node3" presStyleIdx="1" presStyleCnt="3">
         <dgm:presLayoutVars>
           <dgm:chPref val="3"/>
         </dgm:presLayoutVars>
@@ -4488,7 +4600,7 @@
       <dgm:spPr/>
     </dgm:pt>
     <dgm:pt modelId="{FCA885E4-A298-45C6-8E56-1624240BFD6F}" type="pres">
-      <dgm:prSet presAssocID="{F6D970B7-89A8-4323-B40E-827D95103C70}" presName="rootConnector" presStyleLbl="node2" presStyleIdx="1" presStyleCnt="3"/>
+      <dgm:prSet presAssocID="{F6D970B7-89A8-4323-B40E-827D95103C70}" presName="rootConnector" presStyleLbl="node3" presStyleIdx="1" presStyleCnt="3"/>
       <dgm:spPr/>
     </dgm:pt>
     <dgm:pt modelId="{2DCC8B0A-A5C9-435F-A347-ABD9B7B60724}" type="pres">
@@ -4497,6 +4609,10 @@
     </dgm:pt>
     <dgm:pt modelId="{98B083D3-A613-49DF-BBE5-1D4A9470EDA9}" type="pres">
       <dgm:prSet presAssocID="{F6D970B7-89A8-4323-B40E-827D95103C70}" presName="hierChild5" presStyleCnt="0"/>
+      <dgm:spPr/>
+    </dgm:pt>
+    <dgm:pt modelId="{6590810D-3894-4C37-8FDC-B1C1A5D42103}" type="pres">
+      <dgm:prSet presAssocID="{3E13CED3-BB23-4724-99E5-FB9654B64085}" presName="hierChild5" presStyleCnt="0"/>
       <dgm:spPr/>
     </dgm:pt>
     <dgm:pt modelId="{9B4785D1-A25E-41D0-A01A-B4B61E91C329}" type="pres">
@@ -4532,7 +4648,7 @@
       <dgm:spPr/>
     </dgm:pt>
     <dgm:pt modelId="{79AA8734-9A8A-4285-A85C-2A569AE9F4BD}" type="pres">
-      <dgm:prSet presAssocID="{1451AA3E-710F-403F-8553-D337E3EEB665}" presName="Name64" presStyleLbl="parChTrans1D3" presStyleIdx="0" presStyleCnt="1"/>
+      <dgm:prSet presAssocID="{1451AA3E-710F-403F-8553-D337E3EEB665}" presName="Name64" presStyleLbl="parChTrans1D3" presStyleIdx="2" presStyleCnt="3"/>
       <dgm:spPr/>
     </dgm:pt>
     <dgm:pt modelId="{88BC650C-19C8-4BE0-A829-C153A6B8AC9D}" type="pres">
@@ -4548,7 +4664,7 @@
       <dgm:spPr/>
     </dgm:pt>
     <dgm:pt modelId="{D37FCA27-98AE-4D5E-9A03-C791D343A649}" type="pres">
-      <dgm:prSet presAssocID="{604FD5BE-9F15-491F-8B97-B2E20FCBF798}" presName="rootText" presStyleLbl="node3" presStyleIdx="0" presStyleCnt="1">
+      <dgm:prSet presAssocID="{604FD5BE-9F15-491F-8B97-B2E20FCBF798}" presName="rootText" presStyleLbl="node3" presStyleIdx="2" presStyleCnt="3">
         <dgm:presLayoutVars>
           <dgm:chPref val="3"/>
         </dgm:presLayoutVars>
@@ -4556,7 +4672,7 @@
       <dgm:spPr/>
     </dgm:pt>
     <dgm:pt modelId="{156A05F7-5EF7-4332-8CA6-70D352DA5B7D}" type="pres">
-      <dgm:prSet presAssocID="{604FD5BE-9F15-491F-8B97-B2E20FCBF798}" presName="rootConnector" presStyleLbl="node3" presStyleIdx="0" presStyleCnt="1"/>
+      <dgm:prSet presAssocID="{604FD5BE-9F15-491F-8B97-B2E20FCBF798}" presName="rootConnector" presStyleLbl="node3" presStyleIdx="2" presStyleCnt="3"/>
       <dgm:spPr/>
     </dgm:pt>
     <dgm:pt modelId="{097EEA6A-0754-46DA-BD3E-0878F483EFAA}" type="pres">
@@ -4579,43 +4695,65 @@
   <dgm:cxnLst>
     <dgm:cxn modelId="{F8D93C01-087A-4EB4-863F-13B3ED75DAE1}" srcId="{A768C853-21B8-400C-8991-0650BA278A1D}" destId="{629779F5-5991-4CEE-8331-867787B06D04}" srcOrd="2" destOrd="0" parTransId="{822E2945-9506-4FF6-90EA-0C0D907FBF10}" sibTransId="{124DDBFC-3879-4646-8D43-9CD27B13522A}"/>
     <dgm:cxn modelId="{2B9A6C01-46C8-450E-A773-7C8643406A63}" type="presOf" srcId="{C11DBB7E-0079-4899-95FD-5909281E4F6C}" destId="{B0FC1AA3-162F-4AED-9946-653D28AF5C14}" srcOrd="0" destOrd="0" presId="urn:microsoft.com/office/officeart/2009/3/layout/HorizontalOrganizationChart"/>
-    <dgm:cxn modelId="{1BDA650B-7EE6-4B64-8082-B125CE2EB57E}" srcId="{A768C853-21B8-400C-8991-0650BA278A1D}" destId="{F6D970B7-89A8-4323-B40E-827D95103C70}" srcOrd="1" destOrd="0" parTransId="{69AD2F08-ED15-4514-AFE5-C86746139DF7}" sibTransId="{A348EEDB-2690-41B5-B347-EC82FA8514C8}"/>
+    <dgm:cxn modelId="{00957E08-B4ED-4AA2-ADF0-42AA14925860}" type="presOf" srcId="{30C67D2A-AF42-4755-A30D-37AA25F225C4}" destId="{E59A8A91-6703-4CFA-B0A9-709CF36DAC15}" srcOrd="1" destOrd="0" presId="urn:microsoft.com/office/officeart/2009/3/layout/HorizontalOrganizationChart"/>
+    <dgm:cxn modelId="{1BDA650B-7EE6-4B64-8082-B125CE2EB57E}" srcId="{3E13CED3-BB23-4724-99E5-FB9654B64085}" destId="{F6D970B7-89A8-4323-B40E-827D95103C70}" srcOrd="0" destOrd="0" parTransId="{69AD2F08-ED15-4514-AFE5-C86746139DF7}" sibTransId="{A348EEDB-2690-41B5-B347-EC82FA8514C8}"/>
     <dgm:cxn modelId="{09C2D70E-0756-41F2-830A-9BD7694C853D}" type="presOf" srcId="{1451AA3E-710F-403F-8553-D337E3EEB665}" destId="{79AA8734-9A8A-4285-A85C-2A569AE9F4BD}" srcOrd="0" destOrd="0" presId="urn:microsoft.com/office/officeart/2009/3/layout/HorizontalOrganizationChart"/>
     <dgm:cxn modelId="{15196E16-D616-4DB7-AD81-52183C0D2102}" srcId="{629779F5-5991-4CEE-8331-867787B06D04}" destId="{604FD5BE-9F15-491F-8B97-B2E20FCBF798}" srcOrd="0" destOrd="0" parTransId="{1451AA3E-710F-403F-8553-D337E3EEB665}" sibTransId="{26EB7BFF-99A6-49D1-B478-666EDD0ADD8C}"/>
-    <dgm:cxn modelId="{07938F19-41C2-4025-9E56-7545BEBE1395}" type="presOf" srcId="{E63ED82B-4185-436B-AEBB-DBDDED9A9365}" destId="{EBBE1E3B-F9B0-44F5-A0A8-4117FC445DE2}" srcOrd="0" destOrd="0" presId="urn:microsoft.com/office/officeart/2009/3/layout/HorizontalOrganizationChart"/>
-    <dgm:cxn modelId="{CA454027-58CD-4111-A46D-964B1F8ECA7B}" type="presOf" srcId="{E39A4C13-A6FC-4EA3-ACC8-25D43B9AA34B}" destId="{DEE1F79C-2055-47D0-A0EC-02D2E44C2B8E}" srcOrd="0" destOrd="0" presId="urn:microsoft.com/office/officeart/2009/3/layout/HorizontalOrganizationChart"/>
-    <dgm:cxn modelId="{A692A037-8FC4-40E3-B56A-2BF300343A60}" type="presOf" srcId="{F6D970B7-89A8-4323-B40E-827D95103C70}" destId="{2763255F-0BD4-4E1C-98E0-6D4D222EBBCE}" srcOrd="0" destOrd="0" presId="urn:microsoft.com/office/officeart/2009/3/layout/HorizontalOrganizationChart"/>
-    <dgm:cxn modelId="{B70BBB5C-632F-4F7D-8F46-439610531D67}" type="presOf" srcId="{69AD2F08-ED15-4514-AFE5-C86746139DF7}" destId="{20E84821-898A-43E5-885F-6E4D5BF557EF}" srcOrd="0" destOrd="0" presId="urn:microsoft.com/office/officeart/2009/3/layout/HorizontalOrganizationChart"/>
     <dgm:cxn modelId="{5BD1FE45-2951-4700-A0BC-8410C23FCCEF}" srcId="{C11DBB7E-0079-4899-95FD-5909281E4F6C}" destId="{A768C853-21B8-400C-8991-0650BA278A1D}" srcOrd="0" destOrd="0" parTransId="{3392CAB7-99B1-469F-B771-7BAD5502264C}" sibTransId="{504C8362-892E-468E-B35F-6EC6C5D47EAC}"/>
     <dgm:cxn modelId="{B2CDD74B-FE95-4B98-9ABA-197845686C6F}" type="presOf" srcId="{604FD5BE-9F15-491F-8B97-B2E20FCBF798}" destId="{D37FCA27-98AE-4D5E-9A03-C791D343A649}" srcOrd="0" destOrd="0" presId="urn:microsoft.com/office/officeart/2009/3/layout/HorizontalOrganizationChart"/>
     <dgm:cxn modelId="{E2B3484D-F3B3-4D21-ABE4-B5E0143A1207}" type="presOf" srcId="{A768C853-21B8-400C-8991-0650BA278A1D}" destId="{022BFB8E-1A28-44CD-9AAD-D24E57562E43}" srcOrd="1" destOrd="0" presId="urn:microsoft.com/office/officeart/2009/3/layout/HorizontalOrganizationChart"/>
     <dgm:cxn modelId="{5820AA51-C60E-45EB-ACF1-86D36DC8A7DF}" type="presOf" srcId="{822E2945-9506-4FF6-90EA-0C0D907FBF10}" destId="{9B4785D1-A25E-41D0-A01A-B4B61E91C329}" srcOrd="0" destOrd="0" presId="urn:microsoft.com/office/officeart/2009/3/layout/HorizontalOrganizationChart"/>
+    <dgm:cxn modelId="{42F1C151-805D-4170-870E-0F291F7F0B2E}" type="presOf" srcId="{F6D970B7-89A8-4323-B40E-827D95103C70}" destId="{FCA885E4-A298-45C6-8E56-1624240BFD6F}" srcOrd="1" destOrd="0" presId="urn:microsoft.com/office/officeart/2009/3/layout/HorizontalOrganizationChart"/>
+    <dgm:cxn modelId="{F9BE2772-0BE4-4B2B-BD5F-C52D347B9FAB}" type="presOf" srcId="{E63ED82B-4185-436B-AEBB-DBDDED9A9365}" destId="{EBBE1E3B-F9B0-44F5-A0A8-4117FC445DE2}" srcOrd="0" destOrd="0" presId="urn:microsoft.com/office/officeart/2009/3/layout/HorizontalOrganizationChart"/>
+    <dgm:cxn modelId="{64E48D73-6E1D-4135-BF2A-F8D13F03940F}" type="presOf" srcId="{E39A4C13-A6FC-4EA3-ACC8-25D43B9AA34B}" destId="{DEE1F79C-2055-47D0-A0EC-02D2E44C2B8E}" srcOrd="0" destOrd="0" presId="urn:microsoft.com/office/officeart/2009/3/layout/HorizontalOrganizationChart"/>
     <dgm:cxn modelId="{5AF04B77-5A25-495F-A27E-116308A23C59}" type="presOf" srcId="{629779F5-5991-4CEE-8331-867787B06D04}" destId="{886EF146-1258-416F-9A82-6C730DC47079}" srcOrd="0" destOrd="0" presId="urn:microsoft.com/office/officeart/2009/3/layout/HorizontalOrganizationChart"/>
-    <dgm:cxn modelId="{B026B680-00A9-46C8-8760-E297EA791181}" type="presOf" srcId="{F6D970B7-89A8-4323-B40E-827D95103C70}" destId="{FCA885E4-A298-45C6-8E56-1624240BFD6F}" srcOrd="1" destOrd="0" presId="urn:microsoft.com/office/officeart/2009/3/layout/HorizontalOrganizationChart"/>
-    <dgm:cxn modelId="{AD482A81-5E0E-4EF7-AA22-A05CAE3D0EDB}" srcId="{A768C853-21B8-400C-8991-0650BA278A1D}" destId="{E39A4C13-A6FC-4EA3-ACC8-25D43B9AA34B}" srcOrd="0" destOrd="0" parTransId="{E63ED82B-4185-436B-AEBB-DBDDED9A9365}" sibTransId="{CF316429-18A5-4A21-80C5-C743377709F0}"/>
+    <dgm:cxn modelId="{C90E1658-9E16-4E5C-9BA5-D8BDFBB0BD04}" type="presOf" srcId="{E39A4C13-A6FC-4EA3-ACC8-25D43B9AA34B}" destId="{323AD881-19AE-4835-9324-C241FB13FD1D}" srcOrd="1" destOrd="0" presId="urn:microsoft.com/office/officeart/2009/3/layout/HorizontalOrganizationChart"/>
+    <dgm:cxn modelId="{AD482A81-5E0E-4EF7-AA22-A05CAE3D0EDB}" srcId="{30C67D2A-AF42-4755-A30D-37AA25F225C4}" destId="{E39A4C13-A6FC-4EA3-ACC8-25D43B9AA34B}" srcOrd="0" destOrd="0" parTransId="{E63ED82B-4185-436B-AEBB-DBDDED9A9365}" sibTransId="{CF316429-18A5-4A21-80C5-C743377709F0}"/>
+    <dgm:cxn modelId="{B09F1186-B847-44F4-A008-63E4DDF51473}" type="presOf" srcId="{30C67D2A-AF42-4755-A30D-37AA25F225C4}" destId="{131EC883-A543-459C-A4ED-243F765DAB9E}" srcOrd="0" destOrd="0" presId="urn:microsoft.com/office/officeart/2009/3/layout/HorizontalOrganizationChart"/>
+    <dgm:cxn modelId="{A917AD8E-27C3-4AEA-903E-95FD79480CFE}" type="presOf" srcId="{F7097BFA-9BBA-4B54-B479-17BCB8FA6463}" destId="{D68225B9-3F99-4DA4-B07A-384D3FE28F63}" srcOrd="0" destOrd="0" presId="urn:microsoft.com/office/officeart/2009/3/layout/HorizontalOrganizationChart"/>
+    <dgm:cxn modelId="{FEA583B0-9B91-4297-9407-E5814AD85384}" type="presOf" srcId="{F6D970B7-89A8-4323-B40E-827D95103C70}" destId="{2763255F-0BD4-4E1C-98E0-6D4D222EBBCE}" srcOrd="0" destOrd="0" presId="urn:microsoft.com/office/officeart/2009/3/layout/HorizontalOrganizationChart"/>
     <dgm:cxn modelId="{AA9EAAB3-3898-480D-8521-E3839531F6E1}" type="presOf" srcId="{604FD5BE-9F15-491F-8B97-B2E20FCBF798}" destId="{156A05F7-5EF7-4332-8CA6-70D352DA5B7D}" srcOrd="1" destOrd="0" presId="urn:microsoft.com/office/officeart/2009/3/layout/HorizontalOrganizationChart"/>
     <dgm:cxn modelId="{0136B9CA-66F9-494D-9958-C3C6564D238D}" type="presOf" srcId="{629779F5-5991-4CEE-8331-867787B06D04}" destId="{6C989D02-BEC5-4FBF-8D46-51B288F9AC71}" srcOrd="1" destOrd="0" presId="urn:microsoft.com/office/officeart/2009/3/layout/HorizontalOrganizationChart"/>
+    <dgm:cxn modelId="{C3923CCC-77A8-4223-91E9-7A331AD501A5}" srcId="{A768C853-21B8-400C-8991-0650BA278A1D}" destId="{30C67D2A-AF42-4755-A30D-37AA25F225C4}" srcOrd="0" destOrd="0" parTransId="{07B19707-1B28-4929-8FCD-1FFF7AA5773E}" sibTransId="{781BEC80-35D0-43B8-8934-751AEC48A3E2}"/>
     <dgm:cxn modelId="{F17E9EDF-E8D8-4E93-8B98-861966722149}" type="presOf" srcId="{A768C853-21B8-400C-8991-0650BA278A1D}" destId="{54740917-F8A2-4F16-B0FC-AF50B42CCBC0}" srcOrd="0" destOrd="0" presId="urn:microsoft.com/office/officeart/2009/3/layout/HorizontalOrganizationChart"/>
-    <dgm:cxn modelId="{D739BEE7-6E0C-474E-8698-65F88D30184F}" type="presOf" srcId="{E39A4C13-A6FC-4EA3-ACC8-25D43B9AA34B}" destId="{323AD881-19AE-4835-9324-C241FB13FD1D}" srcOrd="1" destOrd="0" presId="urn:microsoft.com/office/officeart/2009/3/layout/HorizontalOrganizationChart"/>
+    <dgm:cxn modelId="{862F22E4-3579-4C21-8DC2-6E82ADD8ABDB}" type="presOf" srcId="{3E13CED3-BB23-4724-99E5-FB9654B64085}" destId="{2E59B674-54FB-49F7-A2E0-9B77D6216653}" srcOrd="1" destOrd="0" presId="urn:microsoft.com/office/officeart/2009/3/layout/HorizontalOrganizationChart"/>
+    <dgm:cxn modelId="{DAC8C1F3-7292-4B90-ADE8-B2BAA6C868A8}" type="presOf" srcId="{07B19707-1B28-4929-8FCD-1FFF7AA5773E}" destId="{54BCEC0A-5F84-4F7F-8660-5B67A8FFE110}" srcOrd="0" destOrd="0" presId="urn:microsoft.com/office/officeart/2009/3/layout/HorizontalOrganizationChart"/>
+    <dgm:cxn modelId="{6C5355F6-2B2B-4164-94F3-95BB5102E098}" type="presOf" srcId="{3E13CED3-BB23-4724-99E5-FB9654B64085}" destId="{0C811EC5-A258-4658-BC55-9714EE710458}" srcOrd="0" destOrd="0" presId="urn:microsoft.com/office/officeart/2009/3/layout/HorizontalOrganizationChart"/>
+    <dgm:cxn modelId="{BBFCB4F9-9BE0-45BD-BDDB-359643E15B08}" type="presOf" srcId="{69AD2F08-ED15-4514-AFE5-C86746139DF7}" destId="{20E84821-898A-43E5-885F-6E4D5BF557EF}" srcOrd="0" destOrd="0" presId="urn:microsoft.com/office/officeart/2009/3/layout/HorizontalOrganizationChart"/>
+    <dgm:cxn modelId="{ABAB5FFE-EC33-43D6-96FA-98436CAF3B0F}" srcId="{A768C853-21B8-400C-8991-0650BA278A1D}" destId="{3E13CED3-BB23-4724-99E5-FB9654B64085}" srcOrd="1" destOrd="0" parTransId="{F7097BFA-9BBA-4B54-B479-17BCB8FA6463}" sibTransId="{387A157D-7CF2-47BF-95F9-A70ACEFF2735}"/>
     <dgm:cxn modelId="{BC16D1E2-CE97-412C-BB18-8281428C86A5}" type="presParOf" srcId="{B0FC1AA3-162F-4AED-9946-653D28AF5C14}" destId="{13AC7328-98E2-47AE-9C70-9B458360A8DE}" srcOrd="0" destOrd="0" presId="urn:microsoft.com/office/officeart/2009/3/layout/HorizontalOrganizationChart"/>
     <dgm:cxn modelId="{7CC68186-1209-4B15-9C53-D50A47AD06BC}" type="presParOf" srcId="{13AC7328-98E2-47AE-9C70-9B458360A8DE}" destId="{55DC576C-FAD2-4661-92D1-5D6AC12A7A48}" srcOrd="0" destOrd="0" presId="urn:microsoft.com/office/officeart/2009/3/layout/HorizontalOrganizationChart"/>
     <dgm:cxn modelId="{C8522792-9DE5-416A-9581-5E92531C76E3}" type="presParOf" srcId="{55DC576C-FAD2-4661-92D1-5D6AC12A7A48}" destId="{54740917-F8A2-4F16-B0FC-AF50B42CCBC0}" srcOrd="0" destOrd="0" presId="urn:microsoft.com/office/officeart/2009/3/layout/HorizontalOrganizationChart"/>
     <dgm:cxn modelId="{3848062A-E094-432F-A92E-C5001034B224}" type="presParOf" srcId="{55DC576C-FAD2-4661-92D1-5D6AC12A7A48}" destId="{022BFB8E-1A28-44CD-9AAD-D24E57562E43}" srcOrd="1" destOrd="0" presId="urn:microsoft.com/office/officeart/2009/3/layout/HorizontalOrganizationChart"/>
     <dgm:cxn modelId="{5E643908-C999-4294-B286-320E523F9D4B}" type="presParOf" srcId="{13AC7328-98E2-47AE-9C70-9B458360A8DE}" destId="{D4EC6848-4242-428B-A776-01D311710E91}" srcOrd="1" destOrd="0" presId="urn:microsoft.com/office/officeart/2009/3/layout/HorizontalOrganizationChart"/>
-    <dgm:cxn modelId="{9633E2AD-708F-4BF3-ADB2-15FAA7A87AC7}" type="presParOf" srcId="{D4EC6848-4242-428B-A776-01D311710E91}" destId="{EBBE1E3B-F9B0-44F5-A0A8-4117FC445DE2}" srcOrd="0" destOrd="0" presId="urn:microsoft.com/office/officeart/2009/3/layout/HorizontalOrganizationChart"/>
-    <dgm:cxn modelId="{78C0DD63-DACA-4289-9557-EB71FFCB1237}" type="presParOf" srcId="{D4EC6848-4242-428B-A776-01D311710E91}" destId="{8FA0DE5F-FF7B-4D55-AD0B-E76AF573D018}" srcOrd="1" destOrd="0" presId="urn:microsoft.com/office/officeart/2009/3/layout/HorizontalOrganizationChart"/>
-    <dgm:cxn modelId="{8527D6F9-7DA9-4C3A-BBBB-452FDD505B9B}" type="presParOf" srcId="{8FA0DE5F-FF7B-4D55-AD0B-E76AF573D018}" destId="{1CB002A8-708E-492D-91A4-61587F5C03CA}" srcOrd="0" destOrd="0" presId="urn:microsoft.com/office/officeart/2009/3/layout/HorizontalOrganizationChart"/>
-    <dgm:cxn modelId="{32998854-6B57-4DF1-BF2B-AC9D0A2B0B44}" type="presParOf" srcId="{1CB002A8-708E-492D-91A4-61587F5C03CA}" destId="{DEE1F79C-2055-47D0-A0EC-02D2E44C2B8E}" srcOrd="0" destOrd="0" presId="urn:microsoft.com/office/officeart/2009/3/layout/HorizontalOrganizationChart"/>
-    <dgm:cxn modelId="{E6AAD305-09ED-4A28-8EEF-2B539BB5EE5D}" type="presParOf" srcId="{1CB002A8-708E-492D-91A4-61587F5C03CA}" destId="{323AD881-19AE-4835-9324-C241FB13FD1D}" srcOrd="1" destOrd="0" presId="urn:microsoft.com/office/officeart/2009/3/layout/HorizontalOrganizationChart"/>
-    <dgm:cxn modelId="{A6EC9872-ADD4-4DB6-8E96-27FC09952E8B}" type="presParOf" srcId="{8FA0DE5F-FF7B-4D55-AD0B-E76AF573D018}" destId="{5D3F7202-55E5-4A7B-93BE-C6723769E538}" srcOrd="1" destOrd="0" presId="urn:microsoft.com/office/officeart/2009/3/layout/HorizontalOrganizationChart"/>
-    <dgm:cxn modelId="{846154EB-A307-4EB1-88C2-911C43A5E313}" type="presParOf" srcId="{8FA0DE5F-FF7B-4D55-AD0B-E76AF573D018}" destId="{21FC7A63-DF82-48EA-A75C-C3D7980BD840}" srcOrd="2" destOrd="0" presId="urn:microsoft.com/office/officeart/2009/3/layout/HorizontalOrganizationChart"/>
-    <dgm:cxn modelId="{82572DB9-D988-415A-94BC-E03FDFF1FC20}" type="presParOf" srcId="{D4EC6848-4242-428B-A776-01D311710E91}" destId="{20E84821-898A-43E5-885F-6E4D5BF557EF}" srcOrd="2" destOrd="0" presId="urn:microsoft.com/office/officeart/2009/3/layout/HorizontalOrganizationChart"/>
-    <dgm:cxn modelId="{1A328E87-E475-4A75-8BC2-77591E9B4C01}" type="presParOf" srcId="{D4EC6848-4242-428B-A776-01D311710E91}" destId="{B6334A19-82A4-42AE-A74C-AC37D776C904}" srcOrd="3" destOrd="0" presId="urn:microsoft.com/office/officeart/2009/3/layout/HorizontalOrganizationChart"/>
-    <dgm:cxn modelId="{26FDAFB1-9C0A-46ED-833F-C5BCD7E6E761}" type="presParOf" srcId="{B6334A19-82A4-42AE-A74C-AC37D776C904}" destId="{2052B658-2C00-47E4-BA4D-C858CC8880E1}" srcOrd="0" destOrd="0" presId="urn:microsoft.com/office/officeart/2009/3/layout/HorizontalOrganizationChart"/>
-    <dgm:cxn modelId="{E672B45C-8BF4-43AA-9789-A10B075E6E8A}" type="presParOf" srcId="{2052B658-2C00-47E4-BA4D-C858CC8880E1}" destId="{2763255F-0BD4-4E1C-98E0-6D4D222EBBCE}" srcOrd="0" destOrd="0" presId="urn:microsoft.com/office/officeart/2009/3/layout/HorizontalOrganizationChart"/>
-    <dgm:cxn modelId="{7B73FBE6-3579-48EC-927B-7A4E1324CD76}" type="presParOf" srcId="{2052B658-2C00-47E4-BA4D-C858CC8880E1}" destId="{FCA885E4-A298-45C6-8E56-1624240BFD6F}" srcOrd="1" destOrd="0" presId="urn:microsoft.com/office/officeart/2009/3/layout/HorizontalOrganizationChart"/>
-    <dgm:cxn modelId="{B6B988A3-6009-4951-A003-D7641F1B8526}" type="presParOf" srcId="{B6334A19-82A4-42AE-A74C-AC37D776C904}" destId="{2DCC8B0A-A5C9-435F-A347-ABD9B7B60724}" srcOrd="1" destOrd="0" presId="urn:microsoft.com/office/officeart/2009/3/layout/HorizontalOrganizationChart"/>
-    <dgm:cxn modelId="{25DFFD4A-48E9-483D-ABD7-661C24E2AC1D}" type="presParOf" srcId="{B6334A19-82A4-42AE-A74C-AC37D776C904}" destId="{98B083D3-A613-49DF-BBE5-1D4A9470EDA9}" srcOrd="2" destOrd="0" presId="urn:microsoft.com/office/officeart/2009/3/layout/HorizontalOrganizationChart"/>
+    <dgm:cxn modelId="{0D2DDBEF-850D-4A43-B9C2-ADF953ABEBE6}" type="presParOf" srcId="{D4EC6848-4242-428B-A776-01D311710E91}" destId="{54BCEC0A-5F84-4F7F-8660-5B67A8FFE110}" srcOrd="0" destOrd="0" presId="urn:microsoft.com/office/officeart/2009/3/layout/HorizontalOrganizationChart"/>
+    <dgm:cxn modelId="{82B4BAE5-CB90-424D-B48A-51CD6B956D38}" type="presParOf" srcId="{D4EC6848-4242-428B-A776-01D311710E91}" destId="{F5CDA664-2A8E-4EF8-8FB5-73D311142289}" srcOrd="1" destOrd="0" presId="urn:microsoft.com/office/officeart/2009/3/layout/HorizontalOrganizationChart"/>
+    <dgm:cxn modelId="{2471A8C8-ABF3-4244-89C9-D46D9207D9B4}" type="presParOf" srcId="{F5CDA664-2A8E-4EF8-8FB5-73D311142289}" destId="{09E1E638-AB33-473C-B96F-6BEAAC7F84F7}" srcOrd="0" destOrd="0" presId="urn:microsoft.com/office/officeart/2009/3/layout/HorizontalOrganizationChart"/>
+    <dgm:cxn modelId="{18F20D27-3855-46AC-9496-A44BE39B94DD}" type="presParOf" srcId="{09E1E638-AB33-473C-B96F-6BEAAC7F84F7}" destId="{131EC883-A543-459C-A4ED-243F765DAB9E}" srcOrd="0" destOrd="0" presId="urn:microsoft.com/office/officeart/2009/3/layout/HorizontalOrganizationChart"/>
+    <dgm:cxn modelId="{03C901BD-A3A3-4DED-8CC6-B756AD22A9CA}" type="presParOf" srcId="{09E1E638-AB33-473C-B96F-6BEAAC7F84F7}" destId="{E59A8A91-6703-4CFA-B0A9-709CF36DAC15}" srcOrd="1" destOrd="0" presId="urn:microsoft.com/office/officeart/2009/3/layout/HorizontalOrganizationChart"/>
+    <dgm:cxn modelId="{8B76B597-4A82-4C26-B993-57B15CC5A7D3}" type="presParOf" srcId="{F5CDA664-2A8E-4EF8-8FB5-73D311142289}" destId="{1A3E6599-2548-4642-906A-CF6DC9523C55}" srcOrd="1" destOrd="0" presId="urn:microsoft.com/office/officeart/2009/3/layout/HorizontalOrganizationChart"/>
+    <dgm:cxn modelId="{FB21640F-535F-4AF5-A461-F0BD3DFC3AA3}" type="presParOf" srcId="{1A3E6599-2548-4642-906A-CF6DC9523C55}" destId="{EBBE1E3B-F9B0-44F5-A0A8-4117FC445DE2}" srcOrd="0" destOrd="0" presId="urn:microsoft.com/office/officeart/2009/3/layout/HorizontalOrganizationChart"/>
+    <dgm:cxn modelId="{305EE85E-0BF0-47AB-9E80-67AB5C19B827}" type="presParOf" srcId="{1A3E6599-2548-4642-906A-CF6DC9523C55}" destId="{8FA0DE5F-FF7B-4D55-AD0B-E76AF573D018}" srcOrd="1" destOrd="0" presId="urn:microsoft.com/office/officeart/2009/3/layout/HorizontalOrganizationChart"/>
+    <dgm:cxn modelId="{E4DC2056-DF41-4D58-98B0-FF4ED98CA999}" type="presParOf" srcId="{8FA0DE5F-FF7B-4D55-AD0B-E76AF573D018}" destId="{1CB002A8-708E-492D-91A4-61587F5C03CA}" srcOrd="0" destOrd="0" presId="urn:microsoft.com/office/officeart/2009/3/layout/HorizontalOrganizationChart"/>
+    <dgm:cxn modelId="{EDB87CB1-C676-4865-9D2A-01915DBAFD13}" type="presParOf" srcId="{1CB002A8-708E-492D-91A4-61587F5C03CA}" destId="{DEE1F79C-2055-47D0-A0EC-02D2E44C2B8E}" srcOrd="0" destOrd="0" presId="urn:microsoft.com/office/officeart/2009/3/layout/HorizontalOrganizationChart"/>
+    <dgm:cxn modelId="{295A86AF-5E61-412C-ABBF-BD55490811A2}" type="presParOf" srcId="{1CB002A8-708E-492D-91A4-61587F5C03CA}" destId="{323AD881-19AE-4835-9324-C241FB13FD1D}" srcOrd="1" destOrd="0" presId="urn:microsoft.com/office/officeart/2009/3/layout/HorizontalOrganizationChart"/>
+    <dgm:cxn modelId="{667E2D72-FBC9-4B96-A598-B5615513888C}" type="presParOf" srcId="{8FA0DE5F-FF7B-4D55-AD0B-E76AF573D018}" destId="{5D3F7202-55E5-4A7B-93BE-C6723769E538}" srcOrd="1" destOrd="0" presId="urn:microsoft.com/office/officeart/2009/3/layout/HorizontalOrganizationChart"/>
+    <dgm:cxn modelId="{F0C732D6-F848-4FD1-8762-C34905B0A2B7}" type="presParOf" srcId="{8FA0DE5F-FF7B-4D55-AD0B-E76AF573D018}" destId="{21FC7A63-DF82-48EA-A75C-C3D7980BD840}" srcOrd="2" destOrd="0" presId="urn:microsoft.com/office/officeart/2009/3/layout/HorizontalOrganizationChart"/>
+    <dgm:cxn modelId="{A6CD2604-0D69-4027-8C81-001BB213E872}" type="presParOf" srcId="{F5CDA664-2A8E-4EF8-8FB5-73D311142289}" destId="{915A99AD-0ED1-4F28-858C-ABBCE49DC6E9}" srcOrd="2" destOrd="0" presId="urn:microsoft.com/office/officeart/2009/3/layout/HorizontalOrganizationChart"/>
+    <dgm:cxn modelId="{25FB41BA-D6A1-4D82-B9CC-8F15EF07C2BB}" type="presParOf" srcId="{D4EC6848-4242-428B-A776-01D311710E91}" destId="{D68225B9-3F99-4DA4-B07A-384D3FE28F63}" srcOrd="2" destOrd="0" presId="urn:microsoft.com/office/officeart/2009/3/layout/HorizontalOrganizationChart"/>
+    <dgm:cxn modelId="{4C21DBDA-7D84-488A-BB4D-4EDEC00DCF26}" type="presParOf" srcId="{D4EC6848-4242-428B-A776-01D311710E91}" destId="{5E548ED9-0B66-41AB-964A-C40BD95BC53C}" srcOrd="3" destOrd="0" presId="urn:microsoft.com/office/officeart/2009/3/layout/HorizontalOrganizationChart"/>
+    <dgm:cxn modelId="{213A4B56-C669-4B3F-B5C7-1A74C8290FCF}" type="presParOf" srcId="{5E548ED9-0B66-41AB-964A-C40BD95BC53C}" destId="{D9B95C35-E9F4-453D-BE7D-CB3B9BEA5019}" srcOrd="0" destOrd="0" presId="urn:microsoft.com/office/officeart/2009/3/layout/HorizontalOrganizationChart"/>
+    <dgm:cxn modelId="{28784D6D-35EC-4312-AC28-4621E172F5EF}" type="presParOf" srcId="{D9B95C35-E9F4-453D-BE7D-CB3B9BEA5019}" destId="{0C811EC5-A258-4658-BC55-9714EE710458}" srcOrd="0" destOrd="0" presId="urn:microsoft.com/office/officeart/2009/3/layout/HorizontalOrganizationChart"/>
+    <dgm:cxn modelId="{E81E1B28-F992-4273-BBEE-9E474F6334D9}" type="presParOf" srcId="{D9B95C35-E9F4-453D-BE7D-CB3B9BEA5019}" destId="{2E59B674-54FB-49F7-A2E0-9B77D6216653}" srcOrd="1" destOrd="0" presId="urn:microsoft.com/office/officeart/2009/3/layout/HorizontalOrganizationChart"/>
+    <dgm:cxn modelId="{7F6AAA09-5DC1-4961-8CEA-F542DFE4B115}" type="presParOf" srcId="{5E548ED9-0B66-41AB-964A-C40BD95BC53C}" destId="{F9828230-7460-4188-8DD8-9F50090716E9}" srcOrd="1" destOrd="0" presId="urn:microsoft.com/office/officeart/2009/3/layout/HorizontalOrganizationChart"/>
+    <dgm:cxn modelId="{2B9174F2-2C5C-4EF1-8C0C-E864153DC708}" type="presParOf" srcId="{F9828230-7460-4188-8DD8-9F50090716E9}" destId="{20E84821-898A-43E5-885F-6E4D5BF557EF}" srcOrd="0" destOrd="0" presId="urn:microsoft.com/office/officeart/2009/3/layout/HorizontalOrganizationChart"/>
+    <dgm:cxn modelId="{5EBD1B51-B5DC-4A62-937C-8E60204878A8}" type="presParOf" srcId="{F9828230-7460-4188-8DD8-9F50090716E9}" destId="{B6334A19-82A4-42AE-A74C-AC37D776C904}" srcOrd="1" destOrd="0" presId="urn:microsoft.com/office/officeart/2009/3/layout/HorizontalOrganizationChart"/>
+    <dgm:cxn modelId="{581E0825-2D4D-4B24-8609-CA2C88998277}" type="presParOf" srcId="{B6334A19-82A4-42AE-A74C-AC37D776C904}" destId="{2052B658-2C00-47E4-BA4D-C858CC8880E1}" srcOrd="0" destOrd="0" presId="urn:microsoft.com/office/officeart/2009/3/layout/HorizontalOrganizationChart"/>
+    <dgm:cxn modelId="{7727B0FB-CC36-48A7-9BCD-647441DCCEF6}" type="presParOf" srcId="{2052B658-2C00-47E4-BA4D-C858CC8880E1}" destId="{2763255F-0BD4-4E1C-98E0-6D4D222EBBCE}" srcOrd="0" destOrd="0" presId="urn:microsoft.com/office/officeart/2009/3/layout/HorizontalOrganizationChart"/>
+    <dgm:cxn modelId="{1328BAD1-BE2F-41C3-82EF-6984FCDE84B2}" type="presParOf" srcId="{2052B658-2C00-47E4-BA4D-C858CC8880E1}" destId="{FCA885E4-A298-45C6-8E56-1624240BFD6F}" srcOrd="1" destOrd="0" presId="urn:microsoft.com/office/officeart/2009/3/layout/HorizontalOrganizationChart"/>
+    <dgm:cxn modelId="{24F578DF-E524-49DF-96B2-5943D1D2BE11}" type="presParOf" srcId="{B6334A19-82A4-42AE-A74C-AC37D776C904}" destId="{2DCC8B0A-A5C9-435F-A347-ABD9B7B60724}" srcOrd="1" destOrd="0" presId="urn:microsoft.com/office/officeart/2009/3/layout/HorizontalOrganizationChart"/>
+    <dgm:cxn modelId="{A0D26B32-B420-40D3-A8DD-9F5F76116DC1}" type="presParOf" srcId="{B6334A19-82A4-42AE-A74C-AC37D776C904}" destId="{98B083D3-A613-49DF-BBE5-1D4A9470EDA9}" srcOrd="2" destOrd="0" presId="urn:microsoft.com/office/officeart/2009/3/layout/HorizontalOrganizationChart"/>
+    <dgm:cxn modelId="{625805CB-946F-4242-9E05-2B0A7E46B751}" type="presParOf" srcId="{5E548ED9-0B66-41AB-964A-C40BD95BC53C}" destId="{6590810D-3894-4C37-8FDC-B1C1A5D42103}" srcOrd="2" destOrd="0" presId="urn:microsoft.com/office/officeart/2009/3/layout/HorizontalOrganizationChart"/>
     <dgm:cxn modelId="{EA0A030E-A594-4C8F-B79C-C998DCC14712}" type="presParOf" srcId="{D4EC6848-4242-428B-A776-01D311710E91}" destId="{9B4785D1-A25E-41D0-A01A-B4B61E91C329}" srcOrd="4" destOrd="0" presId="urn:microsoft.com/office/officeart/2009/3/layout/HorizontalOrganizationChart"/>
     <dgm:cxn modelId="{CE2818E8-DBE5-4075-B2EE-E7C058436885}" type="presParOf" srcId="{D4EC6848-4242-428B-A776-01D311710E91}" destId="{90575340-CF17-443C-9E8C-5EB8F0246A8E}" srcOrd="5" destOrd="0" presId="urn:microsoft.com/office/officeart/2009/3/layout/HorizontalOrganizationChart"/>
     <dgm:cxn modelId="{8EAD36DD-CA40-45C8-A553-FA61A249F6EE}" type="presParOf" srcId="{90575340-CF17-443C-9E8C-5EB8F0246A8E}" destId="{A6502DBB-8043-462E-9BC9-B1F5EDC954C7}" srcOrd="0" destOrd="0" presId="urn:microsoft.com/office/officeart/2009/3/layout/HorizontalOrganizationChart"/>
@@ -6740,6 +6878,62 @@
       </dsp:nvSpPr>
       <dsp:spPr>
         <a:xfrm>
+          <a:off x="3440215" y="2611967"/>
+          <a:ext cx="312555" cy="91440"/>
+        </a:xfrm>
+        <a:custGeom>
+          <a:avLst/>
+          <a:gdLst/>
+          <a:ahLst/>
+          <a:cxnLst/>
+          <a:rect l="0" t="0" r="0" b="0"/>
+          <a:pathLst>
+            <a:path>
+              <a:moveTo>
+                <a:pt x="0" y="45720"/>
+              </a:moveTo>
+              <a:lnTo>
+                <a:pt x="312555" y="45720"/>
+              </a:lnTo>
+            </a:path>
+          </a:pathLst>
+        </a:custGeom>
+        <a:noFill/>
+        <a:ln w="12700" cap="flat" cmpd="sng" algn="ctr">
+          <a:solidFill>
+            <a:schemeClr val="accent1">
+              <a:shade val="80000"/>
+              <a:hueOff val="0"/>
+              <a:satOff val="0"/>
+              <a:lumOff val="0"/>
+              <a:alphaOff val="0"/>
+            </a:schemeClr>
+          </a:solidFill>
+          <a:prstDash val="solid"/>
+          <a:miter lim="800000"/>
+        </a:ln>
+        <a:effectLst/>
+      </dsp:spPr>
+      <dsp:style>
+        <a:lnRef idx="2">
+          <a:scrgbClr r="0" g="0" b="0"/>
+        </a:lnRef>
+        <a:fillRef idx="0">
+          <a:scrgbClr r="0" g="0" b="0"/>
+        </a:fillRef>
+        <a:effectRef idx="0">
+          <a:scrgbClr r="0" g="0" b="0"/>
+        </a:effectRef>
+        <a:fontRef idx="minor"/>
+      </dsp:style>
+    </dsp:sp>
+    <dsp:sp modelId="{D68225B9-3F99-4DA4-B07A-384D3FE28F63}">
+      <dsp:nvSpPr>
+        <dsp:cNvPr id="0" name=""/>
+        <dsp:cNvSpPr/>
+      </dsp:nvSpPr>
+      <dsp:spPr>
+        <a:xfrm>
           <a:off x="1564884" y="2611967"/>
           <a:ext cx="312555" cy="91440"/>
         </a:xfrm>
@@ -6790,6 +6984,62 @@
       </dsp:style>
     </dsp:sp>
     <dsp:sp modelId="{EBBE1E3B-F9B0-44F5-A0A8-4117FC445DE2}">
+      <dsp:nvSpPr>
+        <dsp:cNvPr id="0" name=""/>
+        <dsp:cNvSpPr/>
+      </dsp:nvSpPr>
+      <dsp:spPr>
+        <a:xfrm>
+          <a:off x="3440215" y="1939973"/>
+          <a:ext cx="312555" cy="91440"/>
+        </a:xfrm>
+        <a:custGeom>
+          <a:avLst/>
+          <a:gdLst/>
+          <a:ahLst/>
+          <a:cxnLst/>
+          <a:rect l="0" t="0" r="0" b="0"/>
+          <a:pathLst>
+            <a:path>
+              <a:moveTo>
+                <a:pt x="0" y="45720"/>
+              </a:moveTo>
+              <a:lnTo>
+                <a:pt x="312555" y="45720"/>
+              </a:lnTo>
+            </a:path>
+          </a:pathLst>
+        </a:custGeom>
+        <a:noFill/>
+        <a:ln w="12700" cap="flat" cmpd="sng" algn="ctr">
+          <a:solidFill>
+            <a:schemeClr val="accent1">
+              <a:shade val="80000"/>
+              <a:hueOff val="0"/>
+              <a:satOff val="0"/>
+              <a:lumOff val="0"/>
+              <a:alphaOff val="0"/>
+            </a:schemeClr>
+          </a:solidFill>
+          <a:prstDash val="solid"/>
+          <a:miter lim="800000"/>
+        </a:ln>
+        <a:effectLst/>
+      </dsp:spPr>
+      <dsp:style>
+        <a:lnRef idx="2">
+          <a:scrgbClr r="0" g="0" b="0"/>
+        </a:lnRef>
+        <a:fillRef idx="0">
+          <a:scrgbClr r="0" g="0" b="0"/>
+        </a:fillRef>
+        <a:effectRef idx="0">
+          <a:scrgbClr r="0" g="0" b="0"/>
+        </a:effectRef>
+        <a:fontRef idx="minor"/>
+      </dsp:style>
+    </dsp:sp>
+    <dsp:sp modelId="{54BCEC0A-5F84-4F7F-8660-5B67A8FFE110}">
       <dsp:nvSpPr>
         <dsp:cNvPr id="0" name=""/>
         <dsp:cNvSpPr/>
@@ -6947,6 +7197,84 @@
         <a:ext cx="1562775" cy="476646"/>
       </dsp:txXfrm>
     </dsp:sp>
+    <dsp:sp modelId="{131EC883-A543-459C-A4ED-243F765DAB9E}">
+      <dsp:nvSpPr>
+        <dsp:cNvPr id="0" name=""/>
+        <dsp:cNvSpPr/>
+      </dsp:nvSpPr>
+      <dsp:spPr>
+        <a:xfrm>
+          <a:off x="1877439" y="1747370"/>
+          <a:ext cx="1562775" cy="476646"/>
+        </a:xfrm>
+        <a:prstGeom prst="rect">
+          <a:avLst/>
+        </a:prstGeom>
+        <a:solidFill>
+          <a:schemeClr val="accent1">
+            <a:hueOff val="0"/>
+            <a:satOff val="0"/>
+            <a:lumOff val="0"/>
+            <a:alphaOff val="0"/>
+          </a:schemeClr>
+        </a:solidFill>
+        <a:ln w="12700" cap="flat" cmpd="sng" algn="ctr">
+          <a:solidFill>
+            <a:schemeClr val="lt1">
+              <a:hueOff val="0"/>
+              <a:satOff val="0"/>
+              <a:lumOff val="0"/>
+              <a:alphaOff val="0"/>
+            </a:schemeClr>
+          </a:solidFill>
+          <a:prstDash val="solid"/>
+          <a:miter lim="800000"/>
+        </a:ln>
+        <a:effectLst/>
+      </dsp:spPr>
+      <dsp:style>
+        <a:lnRef idx="2">
+          <a:scrgbClr r="0" g="0" b="0"/>
+        </a:lnRef>
+        <a:fillRef idx="1">
+          <a:scrgbClr r="0" g="0" b="0"/>
+        </a:fillRef>
+        <a:effectRef idx="0">
+          <a:scrgbClr r="0" g="0" b="0"/>
+        </a:effectRef>
+        <a:fontRef idx="minor">
+          <a:schemeClr val="lt1"/>
+        </a:fontRef>
+      </dsp:style>
+      <dsp:txBody>
+        <a:bodyPr spcFirstLastPara="0" vert="horz" wrap="square" lIns="8255" tIns="8255" rIns="8255" bIns="8255" numCol="1" spcCol="1270" anchor="ctr" anchorCtr="0">
+          <a:noAutofit/>
+        </a:bodyPr>
+        <a:lstStyle/>
+        <a:p>
+          <a:pPr marL="0" lvl="0" indent="0" algn="ctr" defTabSz="577850">
+            <a:lnSpc>
+              <a:spcPct val="90000"/>
+            </a:lnSpc>
+            <a:spcBef>
+              <a:spcPct val="0"/>
+            </a:spcBef>
+            <a:spcAft>
+              <a:spcPct val="35000"/>
+            </a:spcAft>
+            <a:buNone/>
+          </a:pPr>
+          <a:r>
+            <a:rPr lang="en-US" sz="1300" kern="1200" dirty="0"/>
+            <a:t>Target Server</a:t>
+          </a:r>
+        </a:p>
+      </dsp:txBody>
+      <dsp:txXfrm>
+        <a:off x="1877439" y="1747370"/>
+        <a:ext cx="1562775" cy="476646"/>
+      </dsp:txXfrm>
+    </dsp:sp>
     <dsp:sp modelId="{DEE1F79C-2055-47D0-A0EC-02D2E44C2B8E}">
       <dsp:nvSpPr>
         <dsp:cNvPr id="0" name=""/>
@@ -6954,7 +7282,7 @@
       </dsp:nvSpPr>
       <dsp:spPr>
         <a:xfrm>
-          <a:off x="1877439" y="1747370"/>
+          <a:off x="3752770" y="1747370"/>
           <a:ext cx="1562775" cy="476646"/>
         </a:xfrm>
         <a:prstGeom prst="rect">
@@ -7039,7 +7367,85 @@
         </a:p>
       </dsp:txBody>
       <dsp:txXfrm>
-        <a:off x="1877439" y="1747370"/>
+        <a:off x="3752770" y="1747370"/>
+        <a:ext cx="1562775" cy="476646"/>
+      </dsp:txXfrm>
+    </dsp:sp>
+    <dsp:sp modelId="{0C811EC5-A258-4658-BC55-9714EE710458}">
+      <dsp:nvSpPr>
+        <dsp:cNvPr id="0" name=""/>
+        <dsp:cNvSpPr/>
+      </dsp:nvSpPr>
+      <dsp:spPr>
+        <a:xfrm>
+          <a:off x="1877439" y="2419363"/>
+          <a:ext cx="1562775" cy="476646"/>
+        </a:xfrm>
+        <a:prstGeom prst="rect">
+          <a:avLst/>
+        </a:prstGeom>
+        <a:solidFill>
+          <a:schemeClr val="accent1">
+            <a:hueOff val="0"/>
+            <a:satOff val="0"/>
+            <a:lumOff val="0"/>
+            <a:alphaOff val="0"/>
+          </a:schemeClr>
+        </a:solidFill>
+        <a:ln w="12700" cap="flat" cmpd="sng" algn="ctr">
+          <a:solidFill>
+            <a:schemeClr val="lt1">
+              <a:hueOff val="0"/>
+              <a:satOff val="0"/>
+              <a:lumOff val="0"/>
+              <a:alphaOff val="0"/>
+            </a:schemeClr>
+          </a:solidFill>
+          <a:prstDash val="solid"/>
+          <a:miter lim="800000"/>
+        </a:ln>
+        <a:effectLst/>
+      </dsp:spPr>
+      <dsp:style>
+        <a:lnRef idx="2">
+          <a:scrgbClr r="0" g="0" b="0"/>
+        </a:lnRef>
+        <a:fillRef idx="1">
+          <a:scrgbClr r="0" g="0" b="0"/>
+        </a:fillRef>
+        <a:effectRef idx="0">
+          <a:scrgbClr r="0" g="0" b="0"/>
+        </a:effectRef>
+        <a:fontRef idx="minor">
+          <a:schemeClr val="lt1"/>
+        </a:fontRef>
+      </dsp:style>
+      <dsp:txBody>
+        <a:bodyPr spcFirstLastPara="0" vert="horz" wrap="square" lIns="8255" tIns="8255" rIns="8255" bIns="8255" numCol="1" spcCol="1270" anchor="ctr" anchorCtr="0">
+          <a:noAutofit/>
+        </a:bodyPr>
+        <a:lstStyle/>
+        <a:p>
+          <a:pPr marL="0" lvl="0" indent="0" algn="ctr" defTabSz="577850">
+            <a:lnSpc>
+              <a:spcPct val="90000"/>
+            </a:lnSpc>
+            <a:spcBef>
+              <a:spcPct val="0"/>
+            </a:spcBef>
+            <a:spcAft>
+              <a:spcPct val="35000"/>
+            </a:spcAft>
+            <a:buNone/>
+          </a:pPr>
+          <a:r>
+            <a:rPr lang="en-US" sz="1300" kern="1200" dirty="0"/>
+            <a:t>Source Server</a:t>
+          </a:r>
+        </a:p>
+      </dsp:txBody>
+      <dsp:txXfrm>
+        <a:off x="1877439" y="2419363"/>
         <a:ext cx="1562775" cy="476646"/>
       </dsp:txXfrm>
     </dsp:sp>
@@ -7050,7 +7456,7 @@
       </dsp:nvSpPr>
       <dsp:spPr>
         <a:xfrm>
-          <a:off x="1877439" y="2419363"/>
+          <a:off x="3752770" y="2419363"/>
           <a:ext cx="1562775" cy="476646"/>
         </a:xfrm>
         <a:prstGeom prst="rect">
@@ -7135,7 +7541,7 @@
         </a:p>
       </dsp:txBody>
       <dsp:txXfrm>
-        <a:off x="1877439" y="2419363"/>
+        <a:off x="3752770" y="2419363"/>
         <a:ext cx="1562775" cy="476646"/>
       </dsp:txXfrm>
     </dsp:sp>
@@ -14173,7 +14579,7 @@
           <a:p>
             <a:fld id="{57070384-08F7-42DB-936D-68C9BA0A1AA9}" type="datetimeFigureOut">
               <a:rPr lang="en-US" smtClean="0"/>
-              <a:t>10/14/2019</a:t>
+              <a:t>10/21/2019</a:t>
             </a:fld>
             <a:endParaRPr lang="en-US"/>
           </a:p>
@@ -14755,7 +15161,7 @@
           <a:p>
             <a:fld id="{93C6802F-8BB5-44AC-B46B-1ABC078DC682}" type="datetimeFigureOut">
               <a:rPr lang="en-US" smtClean="0"/>
-              <a:t>10/14/2019</a:t>
+              <a:t>10/21/2019</a:t>
             </a:fld>
             <a:endParaRPr lang="en-US"/>
           </a:p>
@@ -14953,7 +15359,7 @@
           <a:p>
             <a:fld id="{93C6802F-8BB5-44AC-B46B-1ABC078DC682}" type="datetimeFigureOut">
               <a:rPr lang="en-US" smtClean="0"/>
-              <a:t>10/14/2019</a:t>
+              <a:t>10/21/2019</a:t>
             </a:fld>
             <a:endParaRPr lang="en-US"/>
           </a:p>
@@ -15161,7 +15567,7 @@
           <a:p>
             <a:fld id="{93C6802F-8BB5-44AC-B46B-1ABC078DC682}" type="datetimeFigureOut">
               <a:rPr lang="en-US" smtClean="0"/>
-              <a:t>10/14/2019</a:t>
+              <a:t>10/21/2019</a:t>
             </a:fld>
             <a:endParaRPr lang="en-US"/>
           </a:p>
@@ -15359,7 +15765,7 @@
           <a:p>
             <a:fld id="{93C6802F-8BB5-44AC-B46B-1ABC078DC682}" type="datetimeFigureOut">
               <a:rPr lang="en-US" smtClean="0"/>
-              <a:t>10/14/2019</a:t>
+              <a:t>10/21/2019</a:t>
             </a:fld>
             <a:endParaRPr lang="en-US"/>
           </a:p>
@@ -15634,7 +16040,7 @@
           <a:p>
             <a:fld id="{93C6802F-8BB5-44AC-B46B-1ABC078DC682}" type="datetimeFigureOut">
               <a:rPr lang="en-US" smtClean="0"/>
-              <a:t>10/14/2019</a:t>
+              <a:t>10/21/2019</a:t>
             </a:fld>
             <a:endParaRPr lang="en-US"/>
           </a:p>
@@ -15899,7 +16305,7 @@
           <a:p>
             <a:fld id="{93C6802F-8BB5-44AC-B46B-1ABC078DC682}" type="datetimeFigureOut">
               <a:rPr lang="en-US" smtClean="0"/>
-              <a:t>10/14/2019</a:t>
+              <a:t>10/21/2019</a:t>
             </a:fld>
             <a:endParaRPr lang="en-US"/>
           </a:p>
@@ -16311,7 +16717,7 @@
           <a:p>
             <a:fld id="{93C6802F-8BB5-44AC-B46B-1ABC078DC682}" type="datetimeFigureOut">
               <a:rPr lang="en-US" smtClean="0"/>
-              <a:t>10/14/2019</a:t>
+              <a:t>10/21/2019</a:t>
             </a:fld>
             <a:endParaRPr lang="en-US"/>
           </a:p>
@@ -16452,7 +16858,7 @@
           <a:p>
             <a:fld id="{93C6802F-8BB5-44AC-B46B-1ABC078DC682}" type="datetimeFigureOut">
               <a:rPr lang="en-US" smtClean="0"/>
-              <a:t>10/14/2019</a:t>
+              <a:t>10/21/2019</a:t>
             </a:fld>
             <a:endParaRPr lang="en-US"/>
           </a:p>
@@ -16565,7 +16971,7 @@
           <a:p>
             <a:fld id="{93C6802F-8BB5-44AC-B46B-1ABC078DC682}" type="datetimeFigureOut">
               <a:rPr lang="en-US" smtClean="0"/>
-              <a:t>10/14/2019</a:t>
+              <a:t>10/21/2019</a:t>
             </a:fld>
             <a:endParaRPr lang="en-US"/>
           </a:p>
@@ -16876,7 +17282,7 @@
           <a:p>
             <a:fld id="{93C6802F-8BB5-44AC-B46B-1ABC078DC682}" type="datetimeFigureOut">
               <a:rPr lang="en-US" smtClean="0"/>
-              <a:t>10/14/2019</a:t>
+              <a:t>10/21/2019</a:t>
             </a:fld>
             <a:endParaRPr lang="en-US"/>
           </a:p>
@@ -17164,7 +17570,7 @@
           <a:p>
             <a:fld id="{93C6802F-8BB5-44AC-B46B-1ABC078DC682}" type="datetimeFigureOut">
               <a:rPr lang="en-US" smtClean="0"/>
-              <a:t>10/14/2019</a:t>
+              <a:t>10/21/2019</a:t>
             </a:fld>
             <a:endParaRPr lang="en-US"/>
           </a:p>
@@ -17405,7 +17811,7 @@
           <a:p>
             <a:fld id="{93C6802F-8BB5-44AC-B46B-1ABC078DC682}" type="datetimeFigureOut">
               <a:rPr lang="en-US" smtClean="0"/>
-              <a:t>10/14/2019</a:t>
+              <a:t>10/21/2019</a:t>
             </a:fld>
             <a:endParaRPr lang="en-US"/>
           </a:p>
@@ -17900,12 +18306,31 @@
         </p:nvSpPr>
         <p:spPr/>
         <p:txBody>
-          <a:bodyPr/>
+          <a:bodyPr>
+            <a:normAutofit lnSpcReduction="10000"/>
+          </a:bodyPr>
           <a:lstStyle/>
           <a:p>
             <a:r>
               <a:rPr lang="en-US"/>
               <a:t>Marc Jellinek</a:t>
+            </a:r>
+          </a:p>
+          <a:p>
+            <a:endParaRPr lang="en-US" dirty="0"/>
+          </a:p>
+          <a:p>
+            <a:pPr algn="r"/>
+            <a:r>
+              <a:rPr lang="en-US" dirty="0"/>
+              <a:t>All source files can be found at </a:t>
+            </a:r>
+          </a:p>
+          <a:p>
+            <a:pPr algn="r"/>
+            <a:r>
+              <a:rPr lang="en-US" dirty="0"/>
+              <a:t>https://github.com/marc-jellinek/AzureDataFactoryDemo_SqlSpSink.git</a:t>
             </a:r>
           </a:p>
         </p:txBody>
@@ -24910,7 +25335,7 @@
         <p:spPr/>
         <p:txBody>
           <a:bodyPr>
-            <a:normAutofit lnSpcReduction="10000"/>
+            <a:normAutofit fontScale="92500" lnSpcReduction="10000"/>
           </a:bodyPr>
           <a:lstStyle/>
           <a:p>
@@ -24931,6 +25356,13 @@
             </a:r>
           </a:p>
           <a:p>
+            <a:pPr lvl="1"/>
+            <a:r>
+              <a:rPr lang="en-US" dirty="0"/>
+              <a:t>PowerShell extension</a:t>
+            </a:r>
+          </a:p>
+          <a:p>
             <a:r>
               <a:rPr lang="en-US" dirty="0"/>
               <a:t>Azure Data Studio</a:t>
@@ -24950,7 +25382,7 @@
           </a:p>
           <a:p>
             <a:r>
-              <a:rPr lang="en-US"/>
+              <a:rPr lang="en-US" dirty="0"/>
               <a:t>PowerShell Az Module</a:t>
             </a:r>
           </a:p>
@@ -27905,7 +28337,7 @@
           <p:nvPr>
             <p:extLst>
               <p:ext uri="{D42A27DB-BD31-4B8C-83A1-F6EECF244321}">
-                <p14:modId xmlns:p14="http://schemas.microsoft.com/office/powerpoint/2010/main" val="2846888300"/>
+                <p14:modId xmlns:p14="http://schemas.microsoft.com/office/powerpoint/2010/main" val="2854021538"/>
               </p:ext>
             </p:extLst>
           </p:nvPr>

</xml_diff>